<commit_message>
Fix bad translation in presentation
</commit_message>
<xml_diff>
--- a/SOLID - 4 DIP.pptx
+++ b/SOLID - 4 DIP.pptx
@@ -3969,44 +3969,27 @@
           <a:p>
             <a:r>
               <a:rPr lang="fr-FR" dirty="0"/>
-              <a:t>« </a:t>
-            </a:r>
-            <a:r>
-              <a:rPr lang="en-US" dirty="0"/>
-              <a:t>Cohesion denotes the level of intra-dependency amongst the elements of a software module. In other words, Cohesion is a measure of the degree to which the responsibilities of a single module or a component form a meaningful unit</a:t>
-            </a:r>
-            <a:r>
-              <a:rPr lang="fr-FR" dirty="0"/>
-              <a:t>. », </a:t>
-            </a:r>
-            <a:r>
-              <a:rPr lang="fr-FR" dirty="0" err="1"/>
-              <a:t>Joydip</a:t>
-            </a:r>
-            <a:r>
-              <a:rPr lang="fr-FR" dirty="0"/>
+              <a:t>« La c</a:t>
+            </a:r>
+            <a:r>
+              <a:rPr lang="en-US" dirty="0" err="1"/>
+              <a:t>ohésion</a:t>
+            </a:r>
+            <a:r>
+              <a:rPr lang="en-US" dirty="0"/>
               <a:t> </a:t>
             </a:r>
             <a:r>
-              <a:rPr lang="fr-FR" dirty="0" err="1"/>
-              <a:t>Kanjilal</a:t>
-            </a:r>
-            <a:r>
-              <a:rPr lang="fr-FR" dirty="0"/>
-              <a:t> (MVP Microsoft)</a:t>
-            </a:r>
-          </a:p>
-          <a:p>
-            <a:endParaRPr lang="fr-FR" dirty="0"/>
-          </a:p>
-          <a:p>
-            <a:r>
-              <a:rPr lang="fr-FR" dirty="0"/>
-              <a:t>« La c</a:t>
-            </a:r>
-            <a:r>
-              <a:rPr lang="en-US" dirty="0" err="1"/>
-              <a:t>ohésion</a:t>
+              <a:rPr lang="en-US" dirty="0" err="1"/>
+              <a:t>décrit</a:t>
+            </a:r>
+            <a:r>
+              <a:rPr lang="en-US" dirty="0"/>
+              <a:t> le </a:t>
+            </a:r>
+            <a:r>
+              <a:rPr lang="en-US" dirty="0" err="1"/>
+              <a:t>niveau</a:t>
             </a:r>
             <a:r>
               <a:rPr lang="en-US" dirty="0"/>
@@ -4014,15 +3997,23 @@
             </a:r>
             <a:r>
               <a:rPr lang="en-US" dirty="0" err="1"/>
-              <a:t>décrit</a:t>
-            </a:r>
-            <a:r>
-              <a:rPr lang="en-US" dirty="0"/>
-              <a:t> le </a:t>
-            </a:r>
-            <a:r>
-              <a:rPr lang="en-US" dirty="0" err="1"/>
-              <a:t>niveau</a:t>
+              <a:t>d’interdépendance</a:t>
+            </a:r>
+            <a:r>
+              <a:rPr lang="en-US" dirty="0"/>
+              <a:t> entre les </a:t>
+            </a:r>
+            <a:r>
+              <a:rPr lang="en-US" dirty="0" err="1"/>
+              <a:t>éléments</a:t>
+            </a:r>
+            <a:r>
+              <a:rPr lang="en-US" dirty="0"/>
+              <a:t> d’un module. </a:t>
+            </a:r>
+            <a:r>
+              <a:rPr lang="en-US" dirty="0" err="1"/>
+              <a:t>En</a:t>
             </a:r>
             <a:r>
               <a:rPr lang="en-US" dirty="0"/>
@@ -4030,23 +4021,7 @@
             </a:r>
             <a:r>
               <a:rPr lang="en-US" dirty="0" err="1"/>
-              <a:t>d’inter-dépendance</a:t>
-            </a:r>
-            <a:r>
-              <a:rPr lang="en-US" dirty="0"/>
-              <a:t> entre les </a:t>
-            </a:r>
-            <a:r>
-              <a:rPr lang="en-US" dirty="0" err="1"/>
-              <a:t>éléments</a:t>
-            </a:r>
-            <a:r>
-              <a:rPr lang="en-US" dirty="0"/>
-              <a:t> d’un module. </a:t>
-            </a:r>
-            <a:r>
-              <a:rPr lang="en-US" dirty="0" err="1"/>
-              <a:t>En</a:t>
+              <a:t>d’autres</a:t>
             </a:r>
             <a:r>
               <a:rPr lang="en-US" dirty="0"/>
@@ -4054,7 +4029,15 @@
             </a:r>
             <a:r>
               <a:rPr lang="en-US" dirty="0" err="1"/>
-              <a:t>d’autres</a:t>
+              <a:t>termes</a:t>
+            </a:r>
+            <a:r>
+              <a:rPr lang="en-US" dirty="0"/>
+              <a:t>, la </a:t>
+            </a:r>
+            <a:r>
+              <a:rPr lang="en-US" dirty="0" err="1"/>
+              <a:t>cohésion</a:t>
             </a:r>
             <a:r>
               <a:rPr lang="en-US" dirty="0"/>
@@ -4062,43 +4045,19 @@
             </a:r>
             <a:r>
               <a:rPr lang="en-US" dirty="0" err="1"/>
-              <a:t>termes</a:t>
-            </a:r>
-            <a:r>
-              <a:rPr lang="en-US" dirty="0"/>
-              <a:t>, la </a:t>
-            </a:r>
-            <a:r>
-              <a:rPr lang="en-US" dirty="0" err="1"/>
-              <a:t>cohésion</a:t>
-            </a:r>
-            <a:r>
-              <a:rPr lang="en-US" dirty="0"/>
-              <a:t> </a:t>
-            </a:r>
-            <a:r>
-              <a:rPr lang="en-US" dirty="0" err="1"/>
-              <a:t>est</a:t>
-            </a:r>
-            <a:r>
-              <a:rPr lang="en-US" dirty="0"/>
-              <a:t> la </a:t>
-            </a:r>
-            <a:r>
-              <a:rPr lang="en-US" dirty="0" err="1"/>
               <a:t>mesure</a:t>
             </a:r>
             <a:r>
               <a:rPr lang="en-US" dirty="0"/>
-              <a:t> du </a:t>
-            </a:r>
-            <a:r>
-              <a:rPr lang="en-US" dirty="0" err="1"/>
-              <a:t>degré</a:t>
-            </a:r>
-            <a:r>
-              <a:rPr lang="en-US" dirty="0"/>
-              <a:t> du fait que les </a:t>
+              <a:t> à </a:t>
+            </a:r>
+            <a:r>
+              <a:rPr lang="en-US" dirty="0" err="1"/>
+              <a:t>quel</a:t>
+            </a:r>
+            <a:r>
+              <a:rPr lang="en-US" dirty="0"/>
+              <a:t> point les </a:t>
             </a:r>
             <a:r>
               <a:rPr lang="en-US" dirty="0" err="1"/>
@@ -4106,15 +4065,15 @@
             </a:r>
             <a:r>
               <a:rPr lang="en-US" dirty="0"/>
-              <a:t> </a:t>
-            </a:r>
-            <a:r>
-              <a:rPr lang="en-US" dirty="0" err="1"/>
-              <a:t>d’une</a:t>
-            </a:r>
-            <a:r>
-              <a:rPr lang="en-US" dirty="0"/>
-              <a:t> unique module </a:t>
+              <a:t> d’un module </a:t>
+            </a:r>
+            <a:r>
+              <a:rPr lang="en-US" dirty="0" err="1"/>
+              <a:t>isolé</a:t>
+            </a:r>
+            <a:r>
+              <a:rPr lang="en-US" dirty="0"/>
+              <a:t>, </a:t>
             </a:r>
             <a:r>
               <a:rPr lang="en-US" dirty="0" err="1"/>
@@ -4122,7 +4081,7 @@
             </a:r>
             <a:r>
               <a:rPr lang="en-US" dirty="0"/>
-              <a:t> </a:t>
+              <a:t> d’un </a:t>
             </a:r>
             <a:r>
               <a:rPr lang="en-US" dirty="0" err="1"/>
@@ -4130,11 +4089,11 @@
             </a:r>
             <a:r>
               <a:rPr lang="en-US" dirty="0"/>
-              <a:t> </a:t>
-            </a:r>
-            <a:r>
-              <a:rPr lang="en-US" dirty="0" err="1"/>
-              <a:t>forme</a:t>
+              <a:t>, </a:t>
+            </a:r>
+            <a:r>
+              <a:rPr lang="en-US" dirty="0" err="1"/>
+              <a:t>forment</a:t>
             </a:r>
             <a:r>
               <a:rPr lang="en-US" dirty="0"/>
@@ -4263,248 +4222,219 @@
             </a:r>
             <a:r>
               <a:rPr lang="en-US" dirty="0"/>
-              <a:t> Coupling may be defined as the degree of interdependence that exists between software modules and how closely they are connected to each other. In essence, coupling indicates the strength of interconnectedness between software modules. When this coupling is high, we may assume that the software modules are interdependent, i.e., they cannot function without the other.</a:t>
-            </a:r>
-            <a:r>
-              <a:rPr lang="fr-FR" dirty="0"/>
-              <a:t> »</a:t>
-            </a:r>
-            <a:r>
-              <a:rPr lang="fr-FR" dirty="0"/>
+              <a:t> Le </a:t>
+            </a:r>
+            <a:r>
+              <a:rPr lang="en-US" dirty="0" err="1"/>
+              <a:t>couplage</a:t>
+            </a:r>
+            <a:r>
+              <a:rPr lang="en-US" dirty="0"/>
+              <a:t> </a:t>
+            </a:r>
+            <a:r>
+              <a:rPr lang="en-US" dirty="0" err="1"/>
+              <a:t>peut</a:t>
+            </a:r>
+            <a:r>
+              <a:rPr lang="en-US" dirty="0"/>
+              <a:t> se </a:t>
+            </a:r>
+            <a:r>
+              <a:rPr lang="en-US" dirty="0" err="1"/>
+              <a:t>définir</a:t>
+            </a:r>
+            <a:r>
+              <a:rPr lang="en-US" dirty="0"/>
+              <a:t> </a:t>
+            </a:r>
+            <a:r>
+              <a:rPr lang="en-US" dirty="0" err="1"/>
+              <a:t>comme</a:t>
+            </a:r>
+            <a:r>
+              <a:rPr lang="en-US" dirty="0"/>
+              <a:t> le </a:t>
+            </a:r>
+            <a:r>
+              <a:rPr lang="en-US" dirty="0" err="1"/>
+              <a:t>niveau</a:t>
+            </a:r>
+            <a:r>
+              <a:rPr lang="en-US" dirty="0"/>
+              <a:t> </a:t>
+            </a:r>
+            <a:r>
+              <a:rPr lang="en-US" dirty="0" err="1"/>
+              <a:t>d’interdépendance</a:t>
+            </a:r>
+            <a:r>
+              <a:rPr lang="en-US" dirty="0"/>
+              <a:t> qui </a:t>
+            </a:r>
+            <a:r>
+              <a:rPr lang="en-US" dirty="0" err="1"/>
+              <a:t>existe</a:t>
+            </a:r>
+            <a:r>
+              <a:rPr lang="en-US" dirty="0"/>
+              <a:t> entre des modules et </a:t>
+            </a:r>
+            <a:r>
+              <a:rPr lang="en-US" dirty="0" err="1"/>
+              <a:t>exprime</a:t>
+            </a:r>
+            <a:r>
+              <a:rPr lang="en-US" dirty="0"/>
+              <a:t> </a:t>
+            </a:r>
+            <a:r>
+              <a:rPr lang="en-US" dirty="0" err="1"/>
+              <a:t>leur</a:t>
+            </a:r>
+            <a:r>
+              <a:rPr lang="en-US" dirty="0"/>
+              <a:t> </a:t>
+            </a:r>
+            <a:r>
+              <a:rPr lang="en-US" dirty="0" err="1"/>
+              <a:t>degré</a:t>
+            </a:r>
+            <a:r>
+              <a:rPr lang="en-US" dirty="0"/>
+              <a:t> de </a:t>
+            </a:r>
+            <a:r>
+              <a:rPr lang="en-US" dirty="0" err="1"/>
+              <a:t>proximité</a:t>
+            </a:r>
+            <a:r>
+              <a:rPr lang="en-US" dirty="0"/>
+              <a:t>. </a:t>
+            </a:r>
+            <a:r>
+              <a:rPr lang="en-US" dirty="0" err="1"/>
+              <a:t>Dans</a:t>
+            </a:r>
+            <a:r>
+              <a:rPr lang="en-US" dirty="0"/>
+              <a:t> </a:t>
+            </a:r>
+            <a:r>
+              <a:rPr lang="en-US" dirty="0" err="1"/>
+              <a:t>l’absolu</a:t>
+            </a:r>
+            <a:r>
+              <a:rPr lang="en-US" dirty="0"/>
+              <a:t>, le </a:t>
+            </a:r>
+            <a:r>
+              <a:rPr lang="en-US" dirty="0" err="1"/>
+              <a:t>couplage</a:t>
+            </a:r>
+            <a:r>
+              <a:rPr lang="en-US" dirty="0"/>
+              <a:t> </a:t>
+            </a:r>
+            <a:r>
+              <a:rPr lang="en-US" dirty="0" err="1"/>
+              <a:t>indique</a:t>
+            </a:r>
+            <a:r>
+              <a:rPr lang="en-US" dirty="0"/>
+              <a:t> la force </a:t>
+            </a:r>
+            <a:r>
+              <a:rPr lang="en-US" dirty="0" err="1"/>
+              <a:t>d’interconnexion</a:t>
+            </a:r>
+            <a:r>
+              <a:rPr lang="en-US" dirty="0"/>
+              <a:t> entre les modules. </a:t>
+            </a:r>
+            <a:r>
+              <a:rPr lang="en-US" dirty="0" err="1"/>
+              <a:t>Quand</a:t>
+            </a:r>
+            <a:r>
+              <a:rPr lang="en-US" dirty="0"/>
+              <a:t> le </a:t>
+            </a:r>
+            <a:r>
+              <a:rPr lang="en-US" dirty="0" err="1"/>
+              <a:t>couplage</a:t>
+            </a:r>
+            <a:r>
+              <a:rPr lang="en-US" dirty="0"/>
+              <a:t> </a:t>
+            </a:r>
+            <a:r>
+              <a:rPr lang="en-US" dirty="0" err="1"/>
+              <a:t>est</a:t>
+            </a:r>
+            <a:r>
+              <a:rPr lang="en-US" dirty="0"/>
+              <a:t> </a:t>
+            </a:r>
+            <a:r>
+              <a:rPr lang="en-US" dirty="0" err="1"/>
+              <a:t>élevé</a:t>
+            </a:r>
+            <a:r>
+              <a:rPr lang="en-US" dirty="0"/>
+              <a:t>, on suppose que les modules </a:t>
+            </a:r>
+            <a:r>
+              <a:rPr lang="en-US" dirty="0" err="1"/>
+              <a:t>sont</a:t>
+            </a:r>
+            <a:r>
+              <a:rPr lang="en-US" dirty="0"/>
+              <a:t> </a:t>
+            </a:r>
+            <a:r>
+              <a:rPr lang="en-US" dirty="0" err="1"/>
+              <a:t>interdépendants</a:t>
+            </a:r>
+            <a:r>
+              <a:rPr lang="en-US" dirty="0"/>
               <a:t>, </a:t>
             </a:r>
             <a:r>
-              <a:rPr lang="fr-FR" dirty="0" err="1"/>
-              <a:t>Joydip</a:t>
-            </a:r>
-            <a:r>
-              <a:rPr lang="fr-FR" dirty="0"/>
+              <a:rPr lang="en-US" dirty="0" err="1"/>
+              <a:t>c’est</a:t>
+            </a:r>
+            <a:r>
+              <a:rPr lang="en-US" dirty="0"/>
+              <a:t>-à-dire </a:t>
+            </a:r>
+            <a:r>
+              <a:rPr lang="en-US" dirty="0" err="1"/>
+              <a:t>qu’ils</a:t>
+            </a:r>
+            <a:r>
+              <a:rPr lang="en-US" dirty="0"/>
+              <a:t> ne </a:t>
+            </a:r>
+            <a:r>
+              <a:rPr lang="en-US" dirty="0" err="1"/>
+              <a:t>peuvent</a:t>
+            </a:r>
+            <a:r>
+              <a:rPr lang="en-US" dirty="0"/>
               <a:t> </a:t>
             </a:r>
             <a:r>
-              <a:rPr lang="fr-FR" dirty="0" err="1"/>
-              <a:t>Kanjilal</a:t>
-            </a:r>
-            <a:r>
-              <a:rPr lang="fr-FR" dirty="0"/>
-              <a:t> (MVP Microsoft)</a:t>
-            </a:r>
-          </a:p>
-          <a:p>
-            <a:endParaRPr lang="fr-FR" dirty="0"/>
-          </a:p>
-          <a:p>
-            <a:r>
-              <a:rPr lang="fr-FR" dirty="0"/>
-              <a:t>«</a:t>
-            </a:r>
-            <a:r>
-              <a:rPr lang="en-US" dirty="0"/>
-              <a:t> Le </a:t>
-            </a:r>
-            <a:r>
-              <a:rPr lang="en-US" dirty="0" err="1"/>
-              <a:t>couplage</a:t>
-            </a:r>
-            <a:r>
-              <a:rPr lang="en-US" dirty="0"/>
-              <a:t> </a:t>
-            </a:r>
-            <a:r>
-              <a:rPr lang="en-US" dirty="0" err="1"/>
-              <a:t>peut</a:t>
-            </a:r>
-            <a:r>
-              <a:rPr lang="en-US" dirty="0"/>
-              <a:t> se </a:t>
-            </a:r>
-            <a:r>
-              <a:rPr lang="en-US" dirty="0" err="1"/>
-              <a:t>définir</a:t>
-            </a:r>
-            <a:r>
-              <a:rPr lang="en-US" dirty="0"/>
-              <a:t> </a:t>
-            </a:r>
-            <a:r>
-              <a:rPr lang="en-US" dirty="0" err="1"/>
-              <a:t>comme</a:t>
-            </a:r>
-            <a:r>
-              <a:rPr lang="en-US" dirty="0"/>
-              <a:t> le </a:t>
-            </a:r>
-            <a:r>
-              <a:rPr lang="en-US" dirty="0" err="1"/>
-              <a:t>degré</a:t>
-            </a:r>
-            <a:r>
-              <a:rPr lang="en-US" dirty="0"/>
-              <a:t> </a:t>
-            </a:r>
-            <a:r>
-              <a:rPr lang="en-US" dirty="0" err="1"/>
-              <a:t>d’interdépendance</a:t>
-            </a:r>
-            <a:r>
-              <a:rPr lang="en-US" dirty="0"/>
-              <a:t> qui </a:t>
-            </a:r>
-            <a:r>
-              <a:rPr lang="en-US" dirty="0" err="1"/>
-              <a:t>existe</a:t>
-            </a:r>
-            <a:r>
-              <a:rPr lang="en-US" dirty="0"/>
-              <a:t> entre les modules et à </a:t>
-            </a:r>
-            <a:r>
-              <a:rPr lang="en-US" dirty="0" err="1"/>
-              <a:t>quel</a:t>
-            </a:r>
-            <a:r>
-              <a:rPr lang="en-US" dirty="0"/>
-              <a:t> point </a:t>
-            </a:r>
-            <a:r>
-              <a:rPr lang="en-US" dirty="0" err="1"/>
-              <a:t>ils</a:t>
-            </a:r>
-            <a:r>
-              <a:rPr lang="en-US" dirty="0"/>
-              <a:t> </a:t>
-            </a:r>
-            <a:r>
-              <a:rPr lang="en-US" dirty="0" err="1"/>
-              <a:t>sont</a:t>
-            </a:r>
-            <a:r>
-              <a:rPr lang="en-US" dirty="0"/>
-              <a:t> </a:t>
-            </a:r>
-            <a:r>
-              <a:rPr lang="en-US" dirty="0" err="1"/>
-              <a:t>étroitement</a:t>
-            </a:r>
-            <a:r>
-              <a:rPr lang="en-US" dirty="0"/>
-              <a:t> </a:t>
-            </a:r>
-            <a:r>
-              <a:rPr lang="en-US" dirty="0" err="1"/>
-              <a:t>liés</a:t>
-            </a:r>
-            <a:r>
-              <a:rPr lang="en-US" dirty="0"/>
-              <a:t> entre </a:t>
-            </a:r>
-            <a:r>
-              <a:rPr lang="en-US" dirty="0" err="1"/>
-              <a:t>eux</a:t>
-            </a:r>
-            <a:r>
-              <a:rPr lang="en-US" dirty="0"/>
-              <a:t>. Par essence, le </a:t>
-            </a:r>
-            <a:r>
-              <a:rPr lang="en-US" dirty="0" err="1"/>
-              <a:t>couplage</a:t>
-            </a:r>
-            <a:r>
-              <a:rPr lang="en-US" dirty="0"/>
-              <a:t> </a:t>
-            </a:r>
-            <a:r>
-              <a:rPr lang="en-US" dirty="0" err="1"/>
-              <a:t>indique</a:t>
-            </a:r>
-            <a:r>
-              <a:rPr lang="en-US" dirty="0"/>
-              <a:t> la force </a:t>
-            </a:r>
-            <a:r>
-              <a:rPr lang="en-US" dirty="0" err="1"/>
-              <a:t>d’interconnexion</a:t>
-            </a:r>
-            <a:r>
-              <a:rPr lang="en-US" dirty="0"/>
-              <a:t> entre les modules. </a:t>
-            </a:r>
-            <a:r>
-              <a:rPr lang="en-US" dirty="0" err="1"/>
-              <a:t>Quand</a:t>
-            </a:r>
-            <a:r>
-              <a:rPr lang="en-US" dirty="0"/>
-              <a:t> le </a:t>
-            </a:r>
-            <a:r>
-              <a:rPr lang="en-US" dirty="0" err="1"/>
-              <a:t>couplage</a:t>
-            </a:r>
-            <a:r>
-              <a:rPr lang="en-US" dirty="0"/>
-              <a:t> </a:t>
-            </a:r>
-            <a:r>
-              <a:rPr lang="en-US" dirty="0" err="1"/>
-              <a:t>est</a:t>
-            </a:r>
-            <a:r>
-              <a:rPr lang="en-US" dirty="0"/>
-              <a:t> </a:t>
-            </a:r>
-            <a:r>
-              <a:rPr lang="en-US" dirty="0" err="1"/>
-              <a:t>élevé</a:t>
-            </a:r>
-            <a:r>
-              <a:rPr lang="en-US" dirty="0"/>
-              <a:t>, on assume que les modules </a:t>
-            </a:r>
-            <a:r>
-              <a:rPr lang="en-US" dirty="0" err="1"/>
-              <a:t>sont</a:t>
-            </a:r>
-            <a:r>
-              <a:rPr lang="en-US" dirty="0"/>
-              <a:t> inter-</a:t>
-            </a:r>
-            <a:r>
-              <a:rPr lang="en-US" dirty="0" err="1"/>
-              <a:t>dépendants</a:t>
-            </a:r>
-            <a:r>
-              <a:rPr lang="en-US" dirty="0"/>
-              <a:t>, par </a:t>
-            </a:r>
-            <a:r>
-              <a:rPr lang="en-US" dirty="0" err="1"/>
-              <a:t>exemple</a:t>
-            </a:r>
-            <a:r>
-              <a:rPr lang="en-US" dirty="0"/>
-              <a:t>, </a:t>
-            </a:r>
-            <a:r>
-              <a:rPr lang="en-US" dirty="0" err="1"/>
-              <a:t>ils</a:t>
-            </a:r>
-            <a:r>
-              <a:rPr lang="en-US" dirty="0"/>
-              <a:t> ne </a:t>
-            </a:r>
-            <a:r>
-              <a:rPr lang="en-US" dirty="0" err="1"/>
-              <a:t>peuvent</a:t>
-            </a:r>
-            <a:r>
-              <a:rPr lang="en-US" dirty="0"/>
-              <a:t> </a:t>
-            </a:r>
-            <a:r>
               <a:rPr lang="en-US" dirty="0" err="1"/>
               <a:t>fonctionner</a:t>
+            </a:r>
+            <a:r>
+              <a:rPr lang="en-US" dirty="0"/>
+              <a:t> les </a:t>
+            </a:r>
+            <a:r>
+              <a:rPr lang="en-US" dirty="0" err="1"/>
+              <a:t>uns</a:t>
             </a:r>
             <a:r>
               <a:rPr lang="en-US" dirty="0"/>
@@ -4975,20 +4905,19 @@
             <a:endParaRPr lang="en-US" dirty="0"/>
           </a:p>
           <a:p>
-            <a:pPr>
-              <a:buFont typeface="Arial" panose="020B0604020202020204" pitchFamily="34" charset="0"/>
-              <a:buChar char="•"/>
+            <a:pPr marL="0" indent="0">
+              <a:buNone/>
             </a:pPr>
             <a:r>
               <a:rPr lang="fr-FR" dirty="0"/>
-              <a:t>Module de haut niveau: Plus métier que technique</a:t>
+              <a:t>  Module de haut niveau: Plus métier que technique</a:t>
             </a:r>
             <a:br>
               <a:rPr lang="fr-FR" dirty="0"/>
             </a:br>
             <a:r>
               <a:rPr lang="fr-FR" dirty="0"/>
-              <a:t>Module de bas niveau: Plus technique que métier</a:t>
+              <a:t>  Module de bas niveau: Plus technique que métier</a:t>
             </a:r>
             <a:endParaRPr lang="en-US" dirty="0"/>
           </a:p>

</xml_diff>

<commit_message>
Changing bad file database
</commit_message>
<xml_diff>
--- a/SOLID - 4 DIP.pptx
+++ b/SOLID - 4 DIP.pptx
@@ -13,8 +13,8 @@
     <p:sldId id="299" r:id="rId7"/>
     <p:sldId id="295" r:id="rId8"/>
     <p:sldId id="304" r:id="rId9"/>
-    <p:sldId id="302" r:id="rId10"/>
-    <p:sldId id="316" r:id="rId11"/>
+    <p:sldId id="316" r:id="rId10"/>
+    <p:sldId id="302" r:id="rId11"/>
   </p:sldIdLst>
   <p:sldSz cx="12192000" cy="6858000"/>
   <p:notesSz cx="6858000" cy="9144000"/>
@@ -347,7 +347,7 @@
           <a:p>
             <a:fld id="{4BDF68E2-58F2-4D09-BE8B-E3BD06533059}" type="datetimeFigureOut">
               <a:rPr lang="en-US" dirty="0"/>
-              <a:t>1/9/2017</a:t>
+              <a:t>1/10/2017</a:t>
             </a:fld>
             <a:endParaRPr lang="en-US" dirty="0"/>
           </a:p>
@@ -550,7 +550,7 @@
           <a:p>
             <a:fld id="{2E2D6473-DF6D-4702-B328-E0DD40540A4E}" type="datetimeFigureOut">
               <a:rPr lang="en-US" dirty="0"/>
-              <a:t>1/9/2017</a:t>
+              <a:t>1/10/2017</a:t>
             </a:fld>
             <a:endParaRPr lang="en-US" dirty="0"/>
           </a:p>
@@ -801,7 +801,7 @@
           <a:p>
             <a:fld id="{E26F7E3A-B166-407D-9866-32884E7D5B37}" type="datetimeFigureOut">
               <a:rPr lang="en-US" dirty="0"/>
-              <a:t>1/9/2017</a:t>
+              <a:t>1/10/2017</a:t>
             </a:fld>
             <a:endParaRPr lang="en-US" dirty="0"/>
           </a:p>
@@ -970,7 +970,7 @@
           <a:p>
             <a:fld id="{528FC5F6-F338-4AE4-BB23-26385BCFC423}" type="datetimeFigureOut">
               <a:rPr lang="en-US" dirty="0"/>
-              <a:t>1/9/2017</a:t>
+              <a:t>1/10/2017</a:t>
             </a:fld>
             <a:endParaRPr lang="en-US" dirty="0"/>
           </a:p>
@@ -1308,7 +1308,7 @@
           <a:p>
             <a:fld id="{20EBB0C4-6273-4C6E-B9BD-2EDC30F1CD52}" type="datetimeFigureOut">
               <a:rPr lang="en-US" dirty="0"/>
-              <a:t>1/9/2017</a:t>
+              <a:t>1/10/2017</a:t>
             </a:fld>
             <a:endParaRPr lang="en-US" dirty="0"/>
           </a:p>
@@ -1578,7 +1578,7 @@
           <a:p>
             <a:fld id="{19AB4D41-86C1-4908-B66A-0B50CEB3BF29}" type="datetimeFigureOut">
               <a:rPr lang="en-US" dirty="0"/>
-              <a:t>1/9/2017</a:t>
+              <a:t>1/10/2017</a:t>
             </a:fld>
             <a:endParaRPr lang="en-US" dirty="0"/>
           </a:p>
@@ -1952,7 +1952,7 @@
           <a:p>
             <a:fld id="{E6426E2C-56C1-4E0D-A793-0088A7FDD37E}" type="datetimeFigureOut">
               <a:rPr lang="en-US" dirty="0"/>
-              <a:t>1/9/2017</a:t>
+              <a:t>1/10/2017</a:t>
             </a:fld>
             <a:endParaRPr lang="en-US" dirty="0"/>
           </a:p>
@@ -2065,7 +2065,7 @@
           <a:p>
             <a:fld id="{C8C39B41-D8B5-4052-B551-9B5525EAA8B6}" type="datetimeFigureOut">
               <a:rPr lang="en-US" dirty="0"/>
-              <a:t>1/9/2017</a:t>
+              <a:t>1/10/2017</a:t>
             </a:fld>
             <a:endParaRPr lang="en-US" dirty="0"/>
           </a:p>
@@ -2231,7 +2231,7 @@
           <a:p>
             <a:fld id="{4D94136C-8742-45B2-AF27-D93DF72833A9}" type="datetimeFigureOut">
               <a:rPr lang="en-US" dirty="0"/>
-              <a:t>1/9/2017</a:t>
+              <a:t>1/10/2017</a:t>
             </a:fld>
             <a:endParaRPr lang="en-US" dirty="0"/>
           </a:p>
@@ -2581,7 +2581,7 @@
           <a:p>
             <a:fld id="{32ABBEA6-7C60-4B02-AE87-00D78D8422AF}" type="datetimeFigureOut">
               <a:rPr lang="en-US" dirty="0"/>
-              <a:t>1/9/2017</a:t>
+              <a:t>1/10/2017</a:t>
             </a:fld>
             <a:endParaRPr lang="en-US" dirty="0"/>
           </a:p>
@@ -2959,7 +2959,7 @@
           <a:p>
             <a:fld id="{C9CAD897-D46E-4AD2-BD9B-49DD3E640873}" type="datetimeFigureOut">
               <a:rPr lang="en-US" dirty="0"/>
-              <a:t>1/9/2017</a:t>
+              <a:t>1/10/2017</a:t>
             </a:fld>
             <a:endParaRPr lang="en-US" dirty="0"/>
           </a:p>
@@ -3241,7 +3241,7 @@
           <a:p>
             <a:fld id="{98624D31-43A5-475A-80CF-332C9F6DCF35}" type="datetimeFigureOut">
               <a:rPr lang="en-US" dirty="0"/>
-              <a:t>1/9/2017</a:t>
+              <a:t>1/10/2017</a:t>
             </a:fld>
             <a:endParaRPr lang="en-US" dirty="0"/>
           </a:p>
@@ -3855,53 +3855,121 @@
           </a:p>
         </p:txBody>
       </p:sp>
-      <p:pic>
-        <p:nvPicPr>
-          <p:cNvPr id="1026" name="Picture 2" descr="Dependency Injection in .NET by Mark Seemann, http://www.amazon.com/dp ..."/>
-          <p:cNvPicPr>
-            <a:picLocks noGrp="1" noChangeAspect="1" noChangeArrowheads="1"/>
-          </p:cNvPicPr>
+      <p:sp>
+        <p:nvSpPr>
+          <p:cNvPr id="3" name="Espace réservé du contenu 2"/>
+          <p:cNvSpPr>
+            <a:spLocks noGrp="1"/>
+          </p:cNvSpPr>
           <p:nvPr>
             <p:ph idx="1"/>
           </p:nvPr>
-        </p:nvPicPr>
-        <p:blipFill>
-          <a:blip r:embed="rId2">
-            <a:extLst>
-              <a:ext uri="{28A0092B-C50C-407E-A947-70E740481C1C}">
-                <a14:useLocalDpi xmlns:a14="http://schemas.microsoft.com/office/drawing/2010/main" val="0"/>
-              </a:ext>
-            </a:extLst>
-          </a:blip>
-          <a:srcRect/>
-          <a:stretch>
-            <a:fillRect/>
-          </a:stretch>
-        </p:blipFill>
-        <p:spPr bwMode="auto">
-          <a:xfrm>
-            <a:off x="4517073" y="1846263"/>
-            <a:ext cx="3218180" cy="4022725"/>
-          </a:xfrm>
-          <a:prstGeom prst="rect">
-            <a:avLst/>
-          </a:prstGeom>
-          <a:noFill/>
-          <a:extLst>
-            <a:ext uri="{909E8E84-426E-40DD-AFC4-6F175D3DCCD1}">
-              <a14:hiddenFill xmlns:a14="http://schemas.microsoft.com/office/drawing/2010/main">
-                <a:solidFill>
-                  <a:srgbClr val="FFFFFF"/>
-                </a:solidFill>
-              </a14:hiddenFill>
-            </a:ext>
-          </a:extLst>
-        </p:spPr>
-      </p:pic>
+        </p:nvSpPr>
+        <p:spPr/>
+        <p:txBody>
+          <a:bodyPr>
+            <a:normAutofit/>
+          </a:bodyPr>
+          <a:lstStyle/>
+          <a:p>
+            <a:r>
+              <a:rPr lang="fr-FR" dirty="0">
+                <a:hlinkClick r:id="rId2"/>
+              </a:rPr>
+              <a:t>http://enterprisecraftsmanship.com/2015/09/02/cohesion-coupling-difference/</a:t>
+            </a:r>
+            <a:br>
+              <a:rPr lang="fr-FR" dirty="0"/>
+            </a:br>
+            <a:r>
+              <a:rPr lang="fr-FR" dirty="0">
+                <a:hlinkClick r:id="rId3"/>
+              </a:rPr>
+              <a:t>http://www.infoworld.com/article/2949579/application-architecture/design-for-change-coupling-and-cohesion-in-object-oriented-systems.html</a:t>
+            </a:r>
+            <a:br>
+              <a:rPr lang="fr-FR" dirty="0"/>
+            </a:br>
+            <a:r>
+              <a:rPr lang="fr-FR" dirty="0">
+                <a:hlinkClick r:id="rId4"/>
+              </a:rPr>
+              <a:t>https://thebojan.ninja/2015/04/08/high-cohesion-loose-coupling/</a:t>
+            </a:r>
+            <a:br>
+              <a:rPr lang="fr-FR" dirty="0"/>
+            </a:br>
+            <a:r>
+              <a:rPr lang="fr-FR" dirty="0">
+                <a:hlinkClick r:id="rId5"/>
+              </a:rPr>
+              <a:t>http://www.xyzws.com/scjp/SGS11/5/2</a:t>
+            </a:r>
+            <a:endParaRPr lang="fr-FR" dirty="0"/>
+          </a:p>
+          <a:p>
+            <a:r>
+              <a:rPr lang="fr-FR" dirty="0">
+                <a:hlinkClick r:id="rId6"/>
+              </a:rPr>
+              <a:t>https://lostechies.com/derickbailey/2011/09/22/dependency-injection-is-not-the-same-as-the-dependency-inversion-principle/</a:t>
+            </a:r>
+            <a:endParaRPr lang="fr-FR" dirty="0"/>
+          </a:p>
+          <a:p>
+            <a:r>
+              <a:rPr lang="fr-FR">
+                <a:hlinkClick r:id="rId7"/>
+              </a:rPr>
+              <a:t>http</a:t>
+            </a:r>
+            <a:r>
+              <a:rPr lang="fr-FR" dirty="0">
+                <a:hlinkClick r:id="rId7"/>
+              </a:rPr>
+              <a:t>://blog.ploeh.dk/2010/02/03/ServiceLocatorisanAnti-Pattern/</a:t>
+            </a:r>
+            <a:br>
+              <a:rPr lang="fr-FR" dirty="0"/>
+            </a:br>
+            <a:r>
+              <a:rPr lang="fr-FR" dirty="0">
+                <a:hlinkClick r:id="rId8"/>
+              </a:rPr>
+              <a:t>http://blog.ploeh.dk/2014/05/15/service-locator-violates-solid/</a:t>
+            </a:r>
+            <a:br>
+              <a:rPr lang="fr-FR" dirty="0"/>
+            </a:br>
+            <a:r>
+              <a:rPr lang="fr-FR" dirty="0">
+                <a:hlinkClick r:id="rId9"/>
+              </a:rPr>
+              <a:t>http://blog.ploeh.dk/2015/10/26/service-locator-violates-encapsulation/</a:t>
+            </a:r>
+            <a:endParaRPr lang="fr-FR" dirty="0"/>
+          </a:p>
+          <a:p>
+            <a:br>
+              <a:rPr lang="fr-FR" dirty="0"/>
+            </a:br>
+            <a:endParaRPr lang="fr-FR" dirty="0"/>
+          </a:p>
+          <a:p>
+            <a:endParaRPr lang="fr-FR" dirty="0"/>
+          </a:p>
+          <a:p>
+            <a:endParaRPr lang="fr-FR" dirty="0"/>
+          </a:p>
+          <a:p>
+            <a:endParaRPr lang="fr-FR" dirty="0"/>
+          </a:p>
+        </p:txBody>
+      </p:sp>
     </p:spTree>
     <p:extLst>
       <p:ext uri="{BB962C8B-B14F-4D97-AF65-F5344CB8AC3E}">
-        <p14:creationId xmlns:p14="http://schemas.microsoft.com/office/powerpoint/2010/main" val="1124821970"/>
+        <p14:creationId xmlns:p14="http://schemas.microsoft.com/office/powerpoint/2010/main" val="684659631"/>
       </p:ext>
     </p:extLst>
   </p:cSld>
@@ -4142,6 +4210,45 @@
             <a:r>
               <a:rPr lang="fr-FR" dirty="0"/>
               <a:t> (MVP Microsoft)</a:t>
+            </a:r>
+          </a:p>
+          <a:p>
+            <a:endParaRPr lang="fr-FR" dirty="0"/>
+          </a:p>
+          <a:p>
+            <a:r>
+              <a:rPr lang="fr-FR" dirty="0"/>
+              <a:t>Éléments de modules:</a:t>
+            </a:r>
+          </a:p>
+          <a:p>
+            <a:pPr lvl="1">
+              <a:buFont typeface="Arial" panose="020B0604020202020204" pitchFamily="34" charset="0"/>
+              <a:buChar char="•"/>
+            </a:pPr>
+            <a:r>
+              <a:rPr lang="fr-FR" dirty="0"/>
+              <a:t>Les classes d’un package</a:t>
+            </a:r>
+          </a:p>
+          <a:p>
+            <a:pPr lvl="1">
+              <a:buFont typeface="Arial" panose="020B0604020202020204" pitchFamily="34" charset="0"/>
+              <a:buChar char="•"/>
+            </a:pPr>
+            <a:r>
+              <a:rPr lang="fr-FR" dirty="0"/>
+              <a:t>Les méthodes d’une classe</a:t>
+            </a:r>
+          </a:p>
+          <a:p>
+            <a:pPr lvl="1">
+              <a:buFont typeface="Arial" panose="020B0604020202020204" pitchFamily="34" charset="0"/>
+              <a:buChar char="•"/>
+            </a:pPr>
+            <a:r>
+              <a:rPr lang="fr-FR" dirty="0"/>
+              <a:t>Les méthodes d’une méthode</a:t>
             </a:r>
           </a:p>
           <a:p>
@@ -4310,47 +4417,7 @@
             </a:r>
             <a:r>
               <a:rPr lang="en-US" dirty="0"/>
-              <a:t>. </a:t>
-            </a:r>
-            <a:r>
-              <a:rPr lang="en-US" dirty="0" err="1"/>
-              <a:t>Dans</a:t>
-            </a:r>
-            <a:r>
-              <a:rPr lang="en-US" dirty="0"/>
-              <a:t> </a:t>
-            </a:r>
-            <a:r>
-              <a:rPr lang="en-US" dirty="0" err="1"/>
-              <a:t>l’absolu</a:t>
-            </a:r>
-            <a:r>
-              <a:rPr lang="en-US" dirty="0"/>
-              <a:t>, le </a:t>
-            </a:r>
-            <a:r>
-              <a:rPr lang="en-US" dirty="0" err="1"/>
-              <a:t>couplage</a:t>
-            </a:r>
-            <a:r>
-              <a:rPr lang="en-US" dirty="0"/>
-              <a:t> </a:t>
-            </a:r>
-            <a:r>
-              <a:rPr lang="en-US" dirty="0" err="1"/>
-              <a:t>indique</a:t>
-            </a:r>
-            <a:r>
-              <a:rPr lang="en-US" dirty="0"/>
-              <a:t> la force </a:t>
-            </a:r>
-            <a:r>
-              <a:rPr lang="en-US" dirty="0" err="1"/>
-              <a:t>d’interconnexion</a:t>
-            </a:r>
-            <a:r>
-              <a:rPr lang="en-US" dirty="0"/>
-              <a:t> entre les modules. </a:t>
+              <a:t>. […] </a:t>
             </a:r>
             <a:r>
               <a:rPr lang="en-US" dirty="0" err="1"/>
@@ -4583,7 +4650,7 @@
             <a:pPr lvl="1"/>
             <a:r>
               <a:rPr lang="fr-FR" dirty="0"/>
-              <a:t>La compréhension de ce que fait un module sans avoir à lire les autres</a:t>
+              <a:t>La compréhension de ce que fait un module sans avoir à lire les connaitre les modules dépendants</a:t>
             </a:r>
           </a:p>
           <a:p>
@@ -5138,121 +5205,53 @@
           </a:p>
         </p:txBody>
       </p:sp>
-      <p:sp>
-        <p:nvSpPr>
-          <p:cNvPr id="3" name="Espace réservé du contenu 2"/>
-          <p:cNvSpPr>
-            <a:spLocks noGrp="1"/>
-          </p:cNvSpPr>
+      <p:pic>
+        <p:nvPicPr>
+          <p:cNvPr id="1026" name="Picture 2" descr="Dependency Injection in .NET by Mark Seemann, http://www.amazon.com/dp ..."/>
+          <p:cNvPicPr>
+            <a:picLocks noGrp="1" noChangeAspect="1" noChangeArrowheads="1"/>
+          </p:cNvPicPr>
           <p:nvPr>
             <p:ph idx="1"/>
           </p:nvPr>
-        </p:nvSpPr>
-        <p:spPr/>
-        <p:txBody>
-          <a:bodyPr>
-            <a:normAutofit/>
-          </a:bodyPr>
-          <a:lstStyle/>
-          <a:p>
-            <a:r>
-              <a:rPr lang="fr-FR" dirty="0">
-                <a:hlinkClick r:id="rId2"/>
-              </a:rPr>
-              <a:t>http://enterprisecraftsmanship.com/2015/09/02/cohesion-coupling-difference/</a:t>
-            </a:r>
-            <a:br>
-              <a:rPr lang="fr-FR" dirty="0"/>
-            </a:br>
-            <a:r>
-              <a:rPr lang="fr-FR" dirty="0">
-                <a:hlinkClick r:id="rId3"/>
-              </a:rPr>
-              <a:t>http://www.infoworld.com/article/2949579/application-architecture/design-for-change-coupling-and-cohesion-in-object-oriented-systems.html</a:t>
-            </a:r>
-            <a:br>
-              <a:rPr lang="fr-FR" dirty="0"/>
-            </a:br>
-            <a:r>
-              <a:rPr lang="fr-FR" dirty="0">
-                <a:hlinkClick r:id="rId4"/>
-              </a:rPr>
-              <a:t>https://thebojan.ninja/2015/04/08/high-cohesion-loose-coupling/</a:t>
-            </a:r>
-            <a:br>
-              <a:rPr lang="fr-FR" dirty="0"/>
-            </a:br>
-            <a:r>
-              <a:rPr lang="fr-FR" dirty="0">
-                <a:hlinkClick r:id="rId5"/>
-              </a:rPr>
-              <a:t>http://www.xyzws.com/scjp/SGS11/5/2</a:t>
-            </a:r>
-            <a:endParaRPr lang="fr-FR" dirty="0"/>
-          </a:p>
-          <a:p>
-            <a:r>
-              <a:rPr lang="fr-FR" dirty="0">
-                <a:hlinkClick r:id="rId6"/>
-              </a:rPr>
-              <a:t>https://lostechies.com/derickbailey/2011/09/22/dependency-injection-is-not-the-same-as-the-dependency-inversion-principle/</a:t>
-            </a:r>
-            <a:endParaRPr lang="fr-FR" dirty="0"/>
-          </a:p>
-          <a:p>
-            <a:r>
-              <a:rPr lang="fr-FR">
-                <a:hlinkClick r:id="rId7"/>
-              </a:rPr>
-              <a:t>http</a:t>
-            </a:r>
-            <a:r>
-              <a:rPr lang="fr-FR" dirty="0">
-                <a:hlinkClick r:id="rId7"/>
-              </a:rPr>
-              <a:t>://blog.ploeh.dk/2010/02/03/ServiceLocatorisanAnti-Pattern/</a:t>
-            </a:r>
-            <a:br>
-              <a:rPr lang="fr-FR" dirty="0"/>
-            </a:br>
-            <a:r>
-              <a:rPr lang="fr-FR" dirty="0">
-                <a:hlinkClick r:id="rId8"/>
-              </a:rPr>
-              <a:t>http://blog.ploeh.dk/2014/05/15/service-locator-violates-solid/</a:t>
-            </a:r>
-            <a:br>
-              <a:rPr lang="fr-FR" dirty="0"/>
-            </a:br>
-            <a:r>
-              <a:rPr lang="fr-FR" dirty="0">
-                <a:hlinkClick r:id="rId9"/>
-              </a:rPr>
-              <a:t>http://blog.ploeh.dk/2015/10/26/service-locator-violates-encapsulation/</a:t>
-            </a:r>
-            <a:endParaRPr lang="fr-FR" dirty="0"/>
-          </a:p>
-          <a:p>
-            <a:br>
-              <a:rPr lang="fr-FR" dirty="0"/>
-            </a:br>
-            <a:endParaRPr lang="fr-FR" dirty="0"/>
-          </a:p>
-          <a:p>
-            <a:endParaRPr lang="fr-FR" dirty="0"/>
-          </a:p>
-          <a:p>
-            <a:endParaRPr lang="fr-FR" dirty="0"/>
-          </a:p>
-          <a:p>
-            <a:endParaRPr lang="fr-FR" dirty="0"/>
-          </a:p>
-        </p:txBody>
-      </p:sp>
+        </p:nvPicPr>
+        <p:blipFill>
+          <a:blip r:embed="rId2">
+            <a:extLst>
+              <a:ext uri="{28A0092B-C50C-407E-A947-70E740481C1C}">
+                <a14:useLocalDpi xmlns:a14="http://schemas.microsoft.com/office/drawing/2010/main" val="0"/>
+              </a:ext>
+            </a:extLst>
+          </a:blip>
+          <a:srcRect/>
+          <a:stretch>
+            <a:fillRect/>
+          </a:stretch>
+        </p:blipFill>
+        <p:spPr bwMode="auto">
+          <a:xfrm>
+            <a:off x="4517073" y="1846263"/>
+            <a:ext cx="3218180" cy="4022725"/>
+          </a:xfrm>
+          <a:prstGeom prst="rect">
+            <a:avLst/>
+          </a:prstGeom>
+          <a:noFill/>
+          <a:extLst>
+            <a:ext uri="{909E8E84-426E-40DD-AFC4-6F175D3DCCD1}">
+              <a14:hiddenFill xmlns:a14="http://schemas.microsoft.com/office/drawing/2010/main">
+                <a:solidFill>
+                  <a:srgbClr val="FFFFFF"/>
+                </a:solidFill>
+              </a14:hiddenFill>
+            </a:ext>
+          </a:extLst>
+        </p:spPr>
+      </p:pic>
     </p:spTree>
     <p:extLst>
       <p:ext uri="{BB962C8B-B14F-4D97-AF65-F5344CB8AC3E}">
-        <p14:creationId xmlns:p14="http://schemas.microsoft.com/office/powerpoint/2010/main" val="684659631"/>
+        <p14:creationId xmlns:p14="http://schemas.microsoft.com/office/powerpoint/2010/main" val="1124821970"/>
       </p:ext>
     </p:extLst>
   </p:cSld>

</xml_diff>